<commit_message>
comentário no caso em que é iniciado sem comando
</commit_message>
<xml_diff>
--- a/Apresentação da aplicação demonstradora de análise e edição de imagens.pptx
+++ b/Apresentação da aplicação demonstradora de análise e edição de imagens.pptx
@@ -124,74 +124,6 @@
 </p188:authorLst>
 </file>
 
-<file path=ppt/comments/modernComment_101_F938D4DE.xml><?xml version="1.0" encoding="utf-8"?>
-<p188:cmLst xmlns:a="http://schemas.openxmlformats.org/drawingml/2006/main" xmlns:r="http://schemas.openxmlformats.org/officeDocument/2006/relationships" xmlns:p188="http://schemas.microsoft.com/office/powerpoint/2018/8/main">
-  <p188:cm id="{503B1441-500E-47CB-BD45-62C4027F8095}" authorId="{CC16FB7C-E6BF-E08C-9869-FAAC94A58206}" created="2023-05-30T19:40:28.335">
-    <ac:txMkLst xmlns:ac="http://schemas.microsoft.com/office/drawing/2013/main/command">
-      <pc:docMk xmlns:pc="http://schemas.microsoft.com/office/powerpoint/2013/main/command"/>
-      <pc:sldMk xmlns:pc="http://schemas.microsoft.com/office/powerpoint/2013/main/command" cId="4181251294" sldId="257"/>
-      <ac:spMk id="3" creationId="{36D3E373-DD2F-077E-F0E3-6BEDD8814BE6}"/>
-      <ac:txMk cp="157" len="25">
-        <ac:context len="419" hash="3758343597"/>
-      </ac:txMk>
-    </ac:txMkLst>
-    <p188:pos x="9300485" y="1283965"/>
-    <p188:txBody>
-      <a:bodyPr/>
-      <a:lstStyle/>
-      <a:p>
-        <a:r>
-          <a:rPr lang="pt-PT"/>
-          <a:t>Com a alteração do controller não vai ser assim</a:t>
-        </a:r>
-      </a:p>
-    </p188:txBody>
-  </p188:cm>
-  <p188:cm id="{96C3C38A-BDF6-4129-946B-77A9448CE1D5}" authorId="{CC16FB7C-E6BF-E08C-9869-FAAC94A58206}" created="2023-05-30T19:41:51.185">
-    <pc:sldMkLst xmlns:pc="http://schemas.microsoft.com/office/powerpoint/2013/main/command">
-      <pc:docMk/>
-      <pc:sldMk cId="4181251294" sldId="257"/>
-    </pc:sldMkLst>
-    <p188:txBody>
-      <a:bodyPr/>
-      <a:lstStyle/>
-      <a:p>
-        <a:r>
-          <a:rPr lang="pt-PT"/>
-          <a:t>Não está implementado. Implementa-se ou deixa-se cair?</a:t>
-        </a:r>
-      </a:p>
-    </p188:txBody>
-  </p188:cm>
-</p188:cmLst>
-</file>
-
-<file path=ppt/comments/modernComment_102_DFF113E9.xml><?xml version="1.0" encoding="utf-8"?>
-<p188:cmLst xmlns:a="http://schemas.openxmlformats.org/drawingml/2006/main" xmlns:r="http://schemas.openxmlformats.org/officeDocument/2006/relationships" xmlns:p188="http://schemas.microsoft.com/office/powerpoint/2018/8/main">
-  <p188:cm id="{17E999CE-BBF7-4567-8EA2-1F2259979521}" authorId="{CC16FB7C-E6BF-E08C-9869-FAAC94A58206}" created="2023-05-30T19:42:15.039">
-    <ac:txMkLst xmlns:ac="http://schemas.microsoft.com/office/drawing/2013/main/command">
-      <pc:docMk xmlns:pc="http://schemas.microsoft.com/office/powerpoint/2013/main/command"/>
-      <pc:sldMk xmlns:pc="http://schemas.microsoft.com/office/powerpoint/2013/main/command" cId="3757118441" sldId="258"/>
-      <ac:spMk id="17" creationId="{81AA95BE-C6AA-AB11-D77C-631C8FB34ED2}"/>
-      <ac:txMk cp="233" len="31">
-        <ac:context len="265" hash="2471724063"/>
-      </ac:txMk>
-    </ac:txMkLst>
-    <p188:pos x="3029695" y="3011046"/>
-    <p188:txBody>
-      <a:bodyPr/>
-      <a:lstStyle/>
-      <a:p>
-        <a:r>
-          <a:rPr lang="pt-PT"/>
-          <a:t>Não está a fazer</a:t>
-        </a:r>
-      </a:p>
-    </p188:txBody>
-  </p188:cm>
-</p188:cmLst>
-</file>
-
 <file path=ppt/slideLayouts/slideLayout1.xml><?xml version="1.0" encoding="utf-8"?>
 <p:sldLayout xmlns:a="http://schemas.openxmlformats.org/drawingml/2006/main" xmlns:r="http://schemas.openxmlformats.org/officeDocument/2006/relationships" xmlns:p="http://schemas.openxmlformats.org/presentationml/2006/main" showMasterSp="0" type="title" preserve="1">
   <p:cSld name="Diapositivo de Título">
@@ -418,7 +350,7 @@
           <a:p>
             <a:fld id="{208AF071-E2F8-4483-8BD5-62BB3A1A1F41}" type="datetimeFigureOut">
               <a:rPr lang="pt-PT" smtClean="0"/>
-              <a:t>2023-05-30</a:t>
+              <a:t>2023-06-03</a:t>
             </a:fld>
             <a:endParaRPr lang="pt-PT"/>
           </a:p>
@@ -626,7 +558,7 @@
           <a:p>
             <a:fld id="{208AF071-E2F8-4483-8BD5-62BB3A1A1F41}" type="datetimeFigureOut">
               <a:rPr lang="pt-PT" smtClean="0"/>
-              <a:t>2023-05-30</a:t>
+              <a:t>2023-06-03</a:t>
             </a:fld>
             <a:endParaRPr lang="pt-PT"/>
           </a:p>
@@ -882,7 +814,7 @@
           <a:p>
             <a:fld id="{208AF071-E2F8-4483-8BD5-62BB3A1A1F41}" type="datetimeFigureOut">
               <a:rPr lang="pt-PT" smtClean="0"/>
-              <a:t>2023-05-30</a:t>
+              <a:t>2023-06-03</a:t>
             </a:fld>
             <a:endParaRPr lang="pt-PT"/>
           </a:p>
@@ -1056,7 +988,7 @@
           <a:p>
             <a:fld id="{208AF071-E2F8-4483-8BD5-62BB3A1A1F41}" type="datetimeFigureOut">
               <a:rPr lang="pt-PT" smtClean="0"/>
-              <a:t>2023-05-30</a:t>
+              <a:t>2023-06-03</a:t>
             </a:fld>
             <a:endParaRPr lang="pt-PT"/>
           </a:p>
@@ -1399,7 +1331,7 @@
           <a:p>
             <a:fld id="{208AF071-E2F8-4483-8BD5-62BB3A1A1F41}" type="datetimeFigureOut">
               <a:rPr lang="pt-PT" smtClean="0"/>
-              <a:t>2023-05-30</a:t>
+              <a:t>2023-06-03</a:t>
             </a:fld>
             <a:endParaRPr lang="pt-PT"/>
           </a:p>
@@ -1674,7 +1606,7 @@
           <a:p>
             <a:fld id="{208AF071-E2F8-4483-8BD5-62BB3A1A1F41}" type="datetimeFigureOut">
               <a:rPr lang="pt-PT" smtClean="0"/>
-              <a:t>2023-05-30</a:t>
+              <a:t>2023-06-03</a:t>
             </a:fld>
             <a:endParaRPr lang="pt-PT"/>
           </a:p>
@@ -2053,7 +1985,7 @@
           <a:p>
             <a:fld id="{208AF071-E2F8-4483-8BD5-62BB3A1A1F41}" type="datetimeFigureOut">
               <a:rPr lang="pt-PT" smtClean="0"/>
-              <a:t>2023-05-30</a:t>
+              <a:t>2023-06-03</a:t>
             </a:fld>
             <a:endParaRPr lang="pt-PT"/>
           </a:p>
@@ -2171,7 +2103,7 @@
           <a:p>
             <a:fld id="{208AF071-E2F8-4483-8BD5-62BB3A1A1F41}" type="datetimeFigureOut">
               <a:rPr lang="pt-PT" smtClean="0"/>
-              <a:t>2023-05-30</a:t>
+              <a:t>2023-06-03</a:t>
             </a:fld>
             <a:endParaRPr lang="pt-PT"/>
           </a:p>
@@ -2342,7 +2274,7 @@
           <a:p>
             <a:fld id="{208AF071-E2F8-4483-8BD5-62BB3A1A1F41}" type="datetimeFigureOut">
               <a:rPr lang="pt-PT" smtClean="0"/>
-              <a:t>2023-05-30</a:t>
+              <a:t>2023-06-03</a:t>
             </a:fld>
             <a:endParaRPr lang="pt-PT"/>
           </a:p>
@@ -2696,7 +2628,7 @@
           <a:p>
             <a:fld id="{208AF071-E2F8-4483-8BD5-62BB3A1A1F41}" type="datetimeFigureOut">
               <a:rPr lang="pt-PT" smtClean="0"/>
-              <a:t>2023-05-30</a:t>
+              <a:t>2023-06-03</a:t>
             </a:fld>
             <a:endParaRPr lang="pt-PT"/>
           </a:p>
@@ -3078,7 +3010,7 @@
           <a:p>
             <a:fld id="{208AF071-E2F8-4483-8BD5-62BB3A1A1F41}" type="datetimeFigureOut">
               <a:rPr lang="pt-PT" smtClean="0"/>
-              <a:t>2023-05-30</a:t>
+              <a:t>2023-06-03</a:t>
             </a:fld>
             <a:endParaRPr lang="pt-PT"/>
           </a:p>
@@ -3365,7 +3297,7 @@
           <a:p>
             <a:fld id="{208AF071-E2F8-4483-8BD5-62BB3A1A1F41}" type="datetimeFigureOut">
               <a:rPr lang="pt-PT" smtClean="0"/>
-              <a:t>2023-05-30</a:t>
+              <a:t>2023-06-03</a:t>
             </a:fld>
             <a:endParaRPr lang="pt-PT"/>
           </a:p>
@@ -4179,7 +4111,43 @@
                 <a:ea typeface="Calibri" panose="020F0502020204030204" pitchFamily="34" charset="0"/>
                 <a:cs typeface="Times New Roman" panose="02020603050405020304" pitchFamily="18" charset="0"/>
               </a:rPr>
-              <a:t> Criar uma ferramenta de estatísticas das cores presentes e efetuar pequenas alterações nas imagens;</a:t>
+              <a:t> Criar uma ferramenta de estatística RGB de uma imagem (</a:t>
+            </a:r>
+            <a:r>
+              <a:rPr lang="pt-PT" kern="100" dirty="0" err="1">
+                <a:effectLst/>
+                <a:latin typeface="Calibri" panose="020F0502020204030204" pitchFamily="34" charset="0"/>
+                <a:ea typeface="Calibri" panose="020F0502020204030204" pitchFamily="34" charset="0"/>
+                <a:cs typeface="Times New Roman" panose="02020603050405020304" pitchFamily="18" charset="0"/>
+              </a:rPr>
+              <a:t>png</a:t>
+            </a:r>
+            <a:r>
+              <a:rPr lang="pt-PT" kern="100" dirty="0">
+                <a:effectLst/>
+                <a:latin typeface="Calibri" panose="020F0502020204030204" pitchFamily="34" charset="0"/>
+                <a:ea typeface="Calibri" panose="020F0502020204030204" pitchFamily="34" charset="0"/>
+                <a:cs typeface="Times New Roman" panose="02020603050405020304" pitchFamily="18" charset="0"/>
+              </a:rPr>
+              <a:t>, </a:t>
+            </a:r>
+            <a:r>
+              <a:rPr lang="pt-PT" kern="100" dirty="0" err="1">
+                <a:effectLst/>
+                <a:latin typeface="Calibri" panose="020F0502020204030204" pitchFamily="34" charset="0"/>
+                <a:ea typeface="Calibri" panose="020F0502020204030204" pitchFamily="34" charset="0"/>
+                <a:cs typeface="Times New Roman" panose="02020603050405020304" pitchFamily="18" charset="0"/>
+              </a:rPr>
+              <a:t>jpg</a:t>
+            </a:r>
+            <a:r>
+              <a:rPr lang="pt-PT" kern="100" dirty="0">
+                <a:effectLst/>
+                <a:latin typeface="Calibri" panose="020F0502020204030204" pitchFamily="34" charset="0"/>
+                <a:ea typeface="Calibri" panose="020F0502020204030204" pitchFamily="34" charset="0"/>
+                <a:cs typeface="Times New Roman" panose="02020603050405020304" pitchFamily="18" charset="0"/>
+              </a:rPr>
+              <a:t>,…);</a:t>
             </a:r>
           </a:p>
           <a:p>
@@ -4203,43 +4171,7 @@
                 <a:ea typeface="Calibri" panose="020F0502020204030204" pitchFamily="34" charset="0"/>
                 <a:cs typeface="Times New Roman" panose="02020603050405020304" pitchFamily="18" charset="0"/>
               </a:rPr>
-              <a:t> A interface da aplicação será em linha de comandos que terá como input o comando que se pretende (i.e., “</a:t>
-            </a:r>
-            <a:r>
-              <a:rPr lang="pt-PT" kern="100" dirty="0" err="1">
-                <a:effectLst/>
-                <a:latin typeface="Calibri" panose="020F0502020204030204" pitchFamily="34" charset="0"/>
-                <a:ea typeface="Calibri" panose="020F0502020204030204" pitchFamily="34" charset="0"/>
-                <a:cs typeface="Times New Roman" panose="02020603050405020304" pitchFamily="18" charset="0"/>
-              </a:rPr>
-              <a:t>get-stats</a:t>
-            </a:r>
-            <a:r>
-              <a:rPr lang="pt-PT" kern="100" dirty="0">
-                <a:effectLst/>
-                <a:latin typeface="Calibri" panose="020F0502020204030204" pitchFamily="34" charset="0"/>
-                <a:ea typeface="Calibri" panose="020F0502020204030204" pitchFamily="34" charset="0"/>
-                <a:cs typeface="Times New Roman" panose="02020603050405020304" pitchFamily="18" charset="0"/>
-              </a:rPr>
-              <a:t>” para tirar estatísticas de cor ou “</a:t>
-            </a:r>
-            <a:r>
-              <a:rPr lang="pt-PT" kern="100" dirty="0" err="1">
-                <a:effectLst/>
-                <a:latin typeface="Calibri" panose="020F0502020204030204" pitchFamily="34" charset="0"/>
-                <a:ea typeface="Calibri" panose="020F0502020204030204" pitchFamily="34" charset="0"/>
-                <a:cs typeface="Times New Roman" panose="02020603050405020304" pitchFamily="18" charset="0"/>
-              </a:rPr>
-              <a:t>blur</a:t>
-            </a:r>
-            <a:r>
-              <a:rPr lang="pt-PT" kern="100" dirty="0">
-                <a:effectLst/>
-                <a:latin typeface="Calibri" panose="020F0502020204030204" pitchFamily="34" charset="0"/>
-                <a:ea typeface="Calibri" panose="020F0502020204030204" pitchFamily="34" charset="0"/>
-                <a:cs typeface="Times New Roman" panose="02020603050405020304" pitchFamily="18" charset="0"/>
-              </a:rPr>
-              <a:t>” para tornar a imagem turva) e o caminho para a imagem; </a:t>
+              <a:t> A interface da aplicação será em linha de comandos que terá como input o comando que se pretende e o caminho para a imagem; </a:t>
             </a:r>
           </a:p>
           <a:p>
@@ -4271,7 +4203,24 @@
                 <a:ea typeface="Calibri" panose="020F0502020204030204" pitchFamily="34" charset="0"/>
                 <a:cs typeface="Times New Roman" panose="02020603050405020304" pitchFamily="18" charset="0"/>
               </a:rPr>
-              <a:t>O output gerado será dependente do comando: textual ou uma nova imagem com as alterações processadas.</a:t>
+              <a:t>O output gerado será </a:t>
+            </a:r>
+            <a:r>
+              <a:rPr lang="pt-PT" kern="100" dirty="0">
+                <a:latin typeface="Calibri" panose="020F0502020204030204" pitchFamily="34" charset="0"/>
+                <a:ea typeface="Calibri" panose="020F0502020204030204" pitchFamily="34" charset="0"/>
+                <a:cs typeface="Times New Roman" panose="02020603050405020304" pitchFamily="18" charset="0"/>
+              </a:rPr>
+              <a:t>a estatística em percentagem dos valores RGB</a:t>
+            </a:r>
+            <a:r>
+              <a:rPr lang="pt-PT" kern="100" dirty="0">
+                <a:effectLst/>
+                <a:latin typeface="Calibri" panose="020F0502020204030204" pitchFamily="34" charset="0"/>
+                <a:ea typeface="Calibri" panose="020F0502020204030204" pitchFamily="34" charset="0"/>
+                <a:cs typeface="Times New Roman" panose="02020603050405020304" pitchFamily="18" charset="0"/>
+              </a:rPr>
+              <a:t>.</a:t>
             </a:r>
           </a:p>
           <a:p>
@@ -4289,11 +4238,6 @@
   <p:clrMapOvr>
     <a:masterClrMapping/>
   </p:clrMapOvr>
-  <p:extLst>
-    <p:ext uri="{6950BFC3-D8DA-4A85-94F7-54DA5524770B}">
-      <p188:commentRel xmlns:p188="http://schemas.microsoft.com/office/powerpoint/2018/8/main" r:id="rId2"/>
-    </p:ext>
-  </p:extLst>
 </p:sld>
 </file>
 
@@ -4397,7 +4341,7 @@
               <a:buNone/>
             </a:pPr>
             <a:r>
-              <a:rPr lang="pt-BR" sz="1800" b="0" i="0" u="none" strike="noStrike" cap="none">
+              <a:rPr lang="pt-BR" sz="1800" b="0" i="0" u="none" strike="noStrike" cap="none" dirty="0" err="1">
                 <a:solidFill>
                   <a:schemeClr val="lt1"/>
                 </a:solidFill>
@@ -4406,9 +4350,9 @@
                 <a:cs typeface="Avenir"/>
                 <a:sym typeface="Avenir"/>
               </a:rPr>
-              <a:t>View</a:t>
-            </a:r>
-            <a:endParaRPr/>
+              <a:t>View.cs</a:t>
+            </a:r>
+            <a:endParaRPr dirty="0"/>
           </a:p>
         </p:txBody>
       </p:sp>
@@ -4463,7 +4407,7 @@
               <a:buNone/>
             </a:pPr>
             <a:r>
-              <a:rPr lang="pt-BR" sz="1800" b="0" i="0" u="none" strike="noStrike" cap="none" dirty="0">
+              <a:rPr lang="pt-BR" sz="1800" b="0" i="0" u="none" strike="noStrike" cap="none" dirty="0" err="1">
                 <a:solidFill>
                   <a:schemeClr val="lt1"/>
                 </a:solidFill>
@@ -4472,7 +4416,7 @@
                 <a:cs typeface="Avenir"/>
                 <a:sym typeface="Avenir"/>
               </a:rPr>
-              <a:t>Controller</a:t>
+              <a:t>Controller.cs</a:t>
             </a:r>
             <a:endParaRPr dirty="0"/>
           </a:p>
@@ -4533,7 +4477,7 @@
               <a:buNone/>
             </a:pPr>
             <a:r>
-              <a:rPr lang="pt-BR" sz="1800" b="0" i="0" u="none" strike="noStrike" cap="none" dirty="0">
+              <a:rPr lang="pt-BR" sz="1800" b="0" i="0" u="none" strike="noStrike" cap="none" dirty="0" err="1">
                 <a:solidFill>
                   <a:schemeClr val="lt1"/>
                 </a:solidFill>
@@ -4542,7 +4486,7 @@
                 <a:cs typeface="Avenir"/>
                 <a:sym typeface="Avenir"/>
               </a:rPr>
-              <a:t>Model</a:t>
+              <a:t>Model.cs</a:t>
             </a:r>
             <a:endParaRPr dirty="0"/>
           </a:p>
@@ -4563,7 +4507,7 @@
         <p:spPr>
           <a:xfrm>
             <a:off x="4888820" y="2871280"/>
-            <a:ext cx="3035980" cy="3416320"/>
+            <a:ext cx="3035980" cy="2031325"/>
           </a:xfrm>
           <a:prstGeom prst="rect">
             <a:avLst/>
@@ -4600,15 +4544,7 @@
             </a:pPr>
             <a:r>
               <a:rPr lang="pt-PT" dirty="0"/>
-              <a:t>Imprime um </a:t>
-            </a:r>
-            <a:r>
-              <a:rPr lang="pt-PT" dirty="0" err="1"/>
-              <a:t>prompt</a:t>
-            </a:r>
-            <a:r>
-              <a:rPr lang="pt-PT" dirty="0"/>
-              <a:t> que solicita ao utilizador para inserir o comando;</a:t>
+              <a:t>Mensagem de erro;</a:t>
             </a:r>
           </a:p>
           <a:p>
@@ -4618,7 +4554,7 @@
             </a:pPr>
             <a:r>
               <a:rPr lang="pt-PT" dirty="0"/>
-              <a:t>Mensagem de erro;</a:t>
+              <a:t>Imprime mensagem com instruções;</a:t>
             </a:r>
           </a:p>
           <a:p>
@@ -4628,35 +4564,7 @@
             </a:pPr>
             <a:r>
               <a:rPr lang="pt-PT" dirty="0"/>
-              <a:t>Mensagem de despedida;</a:t>
-            </a:r>
-          </a:p>
-          <a:p>
-            <a:pPr marL="285750" indent="-285750" algn="just">
-              <a:buFont typeface="Wingdings" panose="05000000000000000000" pitchFamily="2" charset="2"/>
-              <a:buChar char="§"/>
-            </a:pPr>
-            <a:r>
-              <a:rPr lang="pt-PT" dirty="0"/>
-              <a:t>Imprime mensagem com instruções;</a:t>
-            </a:r>
-          </a:p>
-          <a:p>
-            <a:pPr marL="285750" indent="-285750" algn="just">
-              <a:buFont typeface="Wingdings" panose="05000000000000000000" pitchFamily="2" charset="2"/>
-              <a:buChar char="§"/>
-            </a:pPr>
-            <a:r>
-              <a:rPr lang="pt-PT" dirty="0"/>
-              <a:t>Mostra estatísticas ou </a:t>
-            </a:r>
-            <a:r>
-              <a:rPr lang="pt-PT" dirty="0" err="1"/>
-              <a:t>path</a:t>
-            </a:r>
-            <a:r>
-              <a:rPr lang="pt-PT" dirty="0"/>
-              <a:t> para a imagem alterada.</a:t>
+              <a:t>Mostra estatísticas RGB.</a:t>
             </a:r>
           </a:p>
         </p:txBody>
@@ -4831,11 +4739,6 @@
   <p:clrMapOvr>
     <a:masterClrMapping/>
   </p:clrMapOvr>
-  <p:extLst>
-    <p:ext uri="{6950BFC3-D8DA-4A85-94F7-54DA5524770B}">
-      <p188:commentRel xmlns:p188="http://schemas.microsoft.com/office/powerpoint/2018/8/main" r:id="rId2"/>
-    </p:ext>
-  </p:extLst>
 </p:sld>
 </file>
 
@@ -5095,7 +4998,24 @@
                 <a:ea typeface="Times New Roman" panose="02020603050405020304" pitchFamily="18" charset="0"/>
                 <a:cs typeface="Times New Roman" panose="02020603050405020304" pitchFamily="18" charset="0"/>
               </a:rPr>
-              <a:t>: Método </a:t>
+              <a:t>: </a:t>
+            </a:r>
+          </a:p>
+          <a:p>
+            <a:pPr lvl="1">
+              <a:buFont typeface="Wingdings" panose="05000000000000000000" pitchFamily="2" charset="2"/>
+              <a:buChar char="§"/>
+            </a:pPr>
+            <a:r>
+              <a:rPr lang="pt-PT" kern="0" dirty="0">
+                <a:solidFill>
+                  <a:srgbClr val="1D2125"/>
+                </a:solidFill>
+                <a:effectLst/>
+                <a:ea typeface="Times New Roman" panose="02020603050405020304" pitchFamily="18" charset="0"/>
+                <a:cs typeface="Times New Roman" panose="02020603050405020304" pitchFamily="18" charset="0"/>
+              </a:rPr>
+              <a:t>Método </a:t>
             </a:r>
             <a:r>
               <a:rPr lang="pt-PT" kern="0" dirty="0" err="1">
@@ -5156,7 +5076,7 @@
                 <a:ea typeface="Times New Roman" panose="02020603050405020304" pitchFamily="18" charset="0"/>
                 <a:cs typeface="Times New Roman" panose="02020603050405020304" pitchFamily="18" charset="0"/>
               </a:rPr>
-              <a:t>PrecisodasInstrucoes</a:t>
+              <a:t>OnInstructionsNeeded</a:t>
             </a:r>
             <a:r>
               <a:rPr lang="pt-PT" kern="0" dirty="0">
@@ -5186,7 +5106,23 @@
                 <a:ea typeface="Times New Roman" panose="02020603050405020304" pitchFamily="18" charset="0"/>
                 <a:cs typeface="Times New Roman" panose="02020603050405020304" pitchFamily="18" charset="0"/>
               </a:rPr>
-              <a:t>, sem que nenhum tenha conhecimento disso e Método </a:t>
+              <a:t>, sem que nenhum tenha conhecimento disso; </a:t>
+            </a:r>
+          </a:p>
+          <a:p>
+            <a:pPr lvl="1">
+              <a:buFont typeface="Wingdings" panose="05000000000000000000" pitchFamily="2" charset="2"/>
+              <a:buChar char="§"/>
+            </a:pPr>
+            <a:r>
+              <a:rPr lang="pt-PT" kern="0" dirty="0">
+                <a:solidFill>
+                  <a:srgbClr val="1D2125"/>
+                </a:solidFill>
+                <a:ea typeface="Times New Roman" panose="02020603050405020304" pitchFamily="18" charset="0"/>
+                <a:cs typeface="Times New Roman" panose="02020603050405020304" pitchFamily="18" charset="0"/>
+              </a:rPr>
+              <a:t>Método </a:t>
             </a:r>
             <a:r>
               <a:rPr lang="pt-PT" kern="0" dirty="0" err="1">
@@ -5267,6 +5203,69 @@
                 <a:cs typeface="Times New Roman" panose="02020603050405020304" pitchFamily="18" charset="0"/>
               </a:rPr>
               <a:t>.</a:t>
+            </a:r>
+          </a:p>
+          <a:p>
+            <a:pPr>
+              <a:buFont typeface="Wingdings" panose="05000000000000000000" pitchFamily="2" charset="2"/>
+              <a:buChar char="§"/>
+            </a:pPr>
+            <a:endParaRPr lang="pt-PT" kern="0" dirty="0">
+              <a:solidFill>
+                <a:srgbClr val="1D2125"/>
+              </a:solidFill>
+              <a:effectLst/>
+              <a:latin typeface="Verdana" panose="020B0604030504040204" pitchFamily="34" charset="0"/>
+              <a:ea typeface="Times New Roman" panose="02020603050405020304" pitchFamily="18" charset="0"/>
+              <a:cs typeface="Times New Roman" panose="02020603050405020304" pitchFamily="18" charset="0"/>
+            </a:endParaRPr>
+          </a:p>
+          <a:p>
+            <a:pPr>
+              <a:buFont typeface="Wingdings" panose="05000000000000000000" pitchFamily="2" charset="2"/>
+              <a:buChar char="§"/>
+            </a:pPr>
+            <a:r>
+              <a:rPr lang="pt-PT" kern="0" dirty="0">
+                <a:solidFill>
+                  <a:srgbClr val="1D2125"/>
+                </a:solidFill>
+                <a:effectLst/>
+                <a:ea typeface="Times New Roman" panose="02020603050405020304" pitchFamily="18" charset="0"/>
+                <a:cs typeface="Times New Roman" panose="02020603050405020304" pitchFamily="18" charset="0"/>
+              </a:rPr>
+              <a:t> </a:t>
+            </a:r>
+            <a:r>
+              <a:rPr lang="pt-PT" kern="0" dirty="0">
+                <a:solidFill>
+                  <a:srgbClr val="1D2125"/>
+                </a:solidFill>
+                <a:ea typeface="Times New Roman" panose="02020603050405020304" pitchFamily="18" charset="0"/>
+                <a:cs typeface="Times New Roman" panose="02020603050405020304" pitchFamily="18" charset="0"/>
+              </a:rPr>
+              <a:t>N</a:t>
+            </a:r>
+            <a:r>
+              <a:rPr lang="pt-PT" kern="0" dirty="0">
+                <a:solidFill>
+                  <a:srgbClr val="1D2125"/>
+                </a:solidFill>
+                <a:effectLst/>
+                <a:ea typeface="Times New Roman" panose="02020603050405020304" pitchFamily="18" charset="0"/>
+                <a:cs typeface="Times New Roman" panose="02020603050405020304" pitchFamily="18" charset="0"/>
+              </a:rPr>
+              <a:t>ão existe</a:t>
+            </a:r>
+            <a:r>
+              <a:rPr lang="pt-PT" kern="0" dirty="0">
+                <a:solidFill>
+                  <a:srgbClr val="1D2125"/>
+                </a:solidFill>
+                <a:ea typeface="Times New Roman" panose="02020603050405020304" pitchFamily="18" charset="0"/>
+                <a:cs typeface="Times New Roman" panose="02020603050405020304" pitchFamily="18" charset="0"/>
+              </a:rPr>
+              <a:t>m eventos /delegados entre a aplicação e a API escolhida.</a:t>
             </a:r>
             <a:br>
               <a:rPr lang="pt-PT" kern="0" dirty="0">
@@ -5960,7 +5959,59 @@
           <a:bodyPr/>
           <a:lstStyle/>
           <a:p>
-            <a:endParaRPr lang="pt-PT"/>
+            <a:r>
+              <a:rPr lang="pt-PT" dirty="0"/>
+              <a:t>Baixo </a:t>
+            </a:r>
+            <a:r>
+              <a:rPr lang="pt-PT" dirty="0" err="1"/>
+              <a:t>acomplamento</a:t>
+            </a:r>
+            <a:r>
+              <a:rPr lang="pt-PT" dirty="0"/>
+              <a:t> – na nossa API foram identificadas cinco dependências entre componentes;</a:t>
+            </a:r>
+          </a:p>
+          <a:p>
+            <a:endParaRPr lang="pt-PT" dirty="0"/>
+          </a:p>
+          <a:p>
+            <a:r>
+              <a:rPr lang="pt-PT" dirty="0"/>
+              <a:t>Interfaces – a criação das interfaces </a:t>
+            </a:r>
+            <a:r>
+              <a:rPr lang="pt-PT" dirty="0" err="1"/>
+              <a:t>IModel</a:t>
+            </a:r>
+            <a:r>
+              <a:rPr lang="pt-PT" dirty="0"/>
+              <a:t> e </a:t>
+            </a:r>
+            <a:r>
+              <a:rPr lang="pt-PT" dirty="0" err="1"/>
+              <a:t>IView</a:t>
+            </a:r>
+            <a:r>
+              <a:rPr lang="pt-PT" dirty="0"/>
+              <a:t> permitem que a aplicação use diferentes tipos de aplicação do </a:t>
+            </a:r>
+            <a:r>
+              <a:rPr lang="pt-PT" dirty="0" err="1"/>
+              <a:t>Model</a:t>
+            </a:r>
+            <a:r>
+              <a:rPr lang="pt-PT" dirty="0"/>
+              <a:t> e do </a:t>
+            </a:r>
+            <a:r>
+              <a:rPr lang="pt-PT" dirty="0" err="1"/>
+              <a:t>View</a:t>
+            </a:r>
+            <a:r>
+              <a:rPr lang="pt-PT" dirty="0"/>
+              <a:t>, caso seja necessário além das próprias interfaces servirem de documentação e contrato entre os vários componentes.</a:t>
+            </a:r>
           </a:p>
         </p:txBody>
       </p:sp>
@@ -6054,7 +6105,60 @@
           <a:bodyPr/>
           <a:lstStyle/>
           <a:p>
-            <a:endParaRPr lang="pt-PT"/>
+            <a:r>
+              <a:rPr lang="pt-PT" dirty="0"/>
+              <a:t> poderia aceitar mais comandos, por exemplo um para tornar a imagem “turva”</a:t>
+            </a:r>
+          </a:p>
+          <a:p>
+            <a:endParaRPr lang="pt-PT" dirty="0"/>
+          </a:p>
+          <a:p>
+            <a:r>
+              <a:rPr lang="pt-PT" dirty="0"/>
+              <a:t>Criado intervalo de luminosidade para definir as cores </a:t>
+            </a:r>
+          </a:p>
+          <a:p>
+            <a:pPr lvl="1"/>
+            <a:r>
+              <a:rPr lang="pt-PT" dirty="0" err="1"/>
+              <a:t>red</a:t>
+            </a:r>
+            <a:r>
+              <a:rPr lang="pt-PT" dirty="0"/>
+              <a:t> (R:100-255 ; G:0-100;  B:0-100);</a:t>
+            </a:r>
+          </a:p>
+          <a:p>
+            <a:pPr lvl="1"/>
+            <a:r>
+              <a:rPr lang="pt-PT" dirty="0"/>
+              <a:t>green (R:0-100 ; G: 100-255;  B:0-100);</a:t>
+            </a:r>
+          </a:p>
+          <a:p>
+            <a:pPr lvl="1"/>
+            <a:r>
+              <a:rPr lang="pt-PT" dirty="0" err="1"/>
+              <a:t>blue</a:t>
+            </a:r>
+            <a:r>
+              <a:rPr lang="pt-PT" dirty="0"/>
+              <a:t> (R</a:t>
+            </a:r>
+            <a:r>
+              <a:rPr lang="pt-PT"/>
+              <a:t>:0-100 </a:t>
+            </a:r>
+            <a:r>
+              <a:rPr lang="pt-PT" dirty="0"/>
+              <a:t>; G:0-100;  B: 100-255);</a:t>
+            </a:r>
+          </a:p>
+          <a:p>
+            <a:pPr lvl="1"/>
+            <a:endParaRPr lang="pt-PT" dirty="0"/>
           </a:p>
         </p:txBody>
       </p:sp>

</xml_diff>